<commit_message>
Updated AIAA 2016 paper and added arXiv version 1
</commit_message>
<xml_diff>
--- a/docs/AIAA 2016/fig/vehicleNotation.pptx
+++ b/docs/AIAA 2016/fig/vehicleNotation.pptx
@@ -104,6 +104,11 @@
       </a:defRPr>
     </a:lvl9pPr>
   </p:defaultTextStyle>
+  <p:extLst>
+    <p:ext uri="{EFAFB233-063F-42B5-8137-9DF3F51BA10A}">
+      <p15:sldGuideLst xmlns:p15="http://schemas.microsoft.com/office/powerpoint/2012/main"/>
+    </p:ext>
+  </p:extLst>
 </p:presentation>
 </file>
 
@@ -238,7 +243,7 @@
           <a:p>
             <a:fld id="{E66E4CF5-B143-4295-9A5E-FC34561A26EB}" type="datetimeFigureOut">
               <a:rPr lang="en-US" smtClean="0"/>
-              <a:t>2/15/2016</a:t>
+              <a:t>2/25/16</a:t>
             </a:fld>
             <a:endParaRPr lang="en-US"/>
           </a:p>
@@ -408,7 +413,7 @@
           <a:p>
             <a:fld id="{E66E4CF5-B143-4295-9A5E-FC34561A26EB}" type="datetimeFigureOut">
               <a:rPr lang="en-US" smtClean="0"/>
-              <a:t>2/15/2016</a:t>
+              <a:t>2/25/16</a:t>
             </a:fld>
             <a:endParaRPr lang="en-US"/>
           </a:p>
@@ -588,7 +593,7 @@
           <a:p>
             <a:fld id="{E66E4CF5-B143-4295-9A5E-FC34561A26EB}" type="datetimeFigureOut">
               <a:rPr lang="en-US" smtClean="0"/>
-              <a:t>2/15/2016</a:t>
+              <a:t>2/25/16</a:t>
             </a:fld>
             <a:endParaRPr lang="en-US"/>
           </a:p>
@@ -758,7 +763,7 @@
           <a:p>
             <a:fld id="{E66E4CF5-B143-4295-9A5E-FC34561A26EB}" type="datetimeFigureOut">
               <a:rPr lang="en-US" smtClean="0"/>
-              <a:t>2/15/2016</a:t>
+              <a:t>2/25/16</a:t>
             </a:fld>
             <a:endParaRPr lang="en-US"/>
           </a:p>
@@ -1004,7 +1009,7 @@
           <a:p>
             <a:fld id="{E66E4CF5-B143-4295-9A5E-FC34561A26EB}" type="datetimeFigureOut">
               <a:rPr lang="en-US" smtClean="0"/>
-              <a:t>2/15/2016</a:t>
+              <a:t>2/25/16</a:t>
             </a:fld>
             <a:endParaRPr lang="en-US"/>
           </a:p>
@@ -1236,7 +1241,7 @@
           <a:p>
             <a:fld id="{E66E4CF5-B143-4295-9A5E-FC34561A26EB}" type="datetimeFigureOut">
               <a:rPr lang="en-US" smtClean="0"/>
-              <a:t>2/15/2016</a:t>
+              <a:t>2/25/16</a:t>
             </a:fld>
             <a:endParaRPr lang="en-US"/>
           </a:p>
@@ -1603,7 +1608,7 @@
           <a:p>
             <a:fld id="{E66E4CF5-B143-4295-9A5E-FC34561A26EB}" type="datetimeFigureOut">
               <a:rPr lang="en-US" smtClean="0"/>
-              <a:t>2/15/2016</a:t>
+              <a:t>2/25/16</a:t>
             </a:fld>
             <a:endParaRPr lang="en-US"/>
           </a:p>
@@ -1721,7 +1726,7 @@
           <a:p>
             <a:fld id="{E66E4CF5-B143-4295-9A5E-FC34561A26EB}" type="datetimeFigureOut">
               <a:rPr lang="en-US" smtClean="0"/>
-              <a:t>2/15/2016</a:t>
+              <a:t>2/25/16</a:t>
             </a:fld>
             <a:endParaRPr lang="en-US"/>
           </a:p>
@@ -1816,7 +1821,7 @@
           <a:p>
             <a:fld id="{E66E4CF5-B143-4295-9A5E-FC34561A26EB}" type="datetimeFigureOut">
               <a:rPr lang="en-US" smtClean="0"/>
-              <a:t>2/15/2016</a:t>
+              <a:t>2/25/16</a:t>
             </a:fld>
             <a:endParaRPr lang="en-US"/>
           </a:p>
@@ -2093,7 +2098,7 @@
           <a:p>
             <a:fld id="{E66E4CF5-B143-4295-9A5E-FC34561A26EB}" type="datetimeFigureOut">
               <a:rPr lang="en-US" smtClean="0"/>
-              <a:t>2/15/2016</a:t>
+              <a:t>2/25/16</a:t>
             </a:fld>
             <a:endParaRPr lang="en-US"/>
           </a:p>
@@ -2350,7 +2355,7 @@
           <a:p>
             <a:fld id="{E66E4CF5-B143-4295-9A5E-FC34561A26EB}" type="datetimeFigureOut">
               <a:rPr lang="en-US" smtClean="0"/>
-              <a:t>2/15/2016</a:t>
+              <a:t>2/25/16</a:t>
             </a:fld>
             <a:endParaRPr lang="en-US"/>
           </a:p>
@@ -2563,7 +2568,7 @@
           <a:p>
             <a:fld id="{E66E4CF5-B143-4295-9A5E-FC34561A26EB}" type="datetimeFigureOut">
               <a:rPr lang="en-US" smtClean="0"/>
-              <a:t>2/15/2016</a:t>
+              <a:t>2/25/16</a:t>
             </a:fld>
             <a:endParaRPr lang="en-US"/>
           </a:p>
@@ -3015,8 +3020,8 @@
           </a:p>
         </p:txBody>
       </p:sp>
-      <mc:AlternateContent xmlns:mc="http://schemas.openxmlformats.org/markup-compatibility/2006">
-        <mc:Choice xmlns:a14="http://schemas.microsoft.com/office/drawing/2010/main" Requires="a14">
+      <mc:AlternateContent xmlns:mc="http://schemas.openxmlformats.org/markup-compatibility/2006" xmlns:a14="http://schemas.microsoft.com/office/drawing/2010/main">
+        <mc:Choice Requires="a14">
           <p:sp>
             <p:nvSpPr>
               <p:cNvPr id="193" name="Pentagon 192"/>
@@ -3077,7 +3082,7 @@
                         <m:sSubPr>
                           <m:ctrlPr>
                             <a:rPr lang="en-US" sz="3600" b="0" i="1" smtClean="0">
-                              <a:latin typeface="Cambria Math" panose="02040503050406030204" pitchFamily="18" charset="0"/>
+                              <a:latin typeface="Cambria Math" charset="0"/>
                             </a:rPr>
                           </m:ctrlPr>
                         </m:sSubPr>
@@ -3106,7 +3111,7 @@
             </p:txBody>
           </p:sp>
         </mc:Choice>
-        <mc:Fallback>
+        <mc:Fallback xmlns="">
           <p:sp>
             <p:nvSpPr>
               <p:cNvPr id="193" name="Pentagon 192"/>
@@ -3153,8 +3158,8 @@
           </p:sp>
         </mc:Fallback>
       </mc:AlternateContent>
-      <mc:AlternateContent xmlns:mc="http://schemas.openxmlformats.org/markup-compatibility/2006">
-        <mc:Choice xmlns:a14="http://schemas.microsoft.com/office/drawing/2010/main" Requires="a14">
+      <mc:AlternateContent xmlns:mc="http://schemas.openxmlformats.org/markup-compatibility/2006" xmlns:a14="http://schemas.microsoft.com/office/drawing/2010/main">
+        <mc:Choice Requires="a14">
           <p:sp>
             <p:nvSpPr>
               <p:cNvPr id="194" name="Pentagon 193"/>
@@ -3215,7 +3220,7 @@
                         <m:sSubPr>
                           <m:ctrlPr>
                             <a:rPr lang="en-US" sz="3600" b="0" i="1" smtClean="0">
-                              <a:latin typeface="Cambria Math" panose="02040503050406030204" pitchFamily="18" charset="0"/>
+                              <a:latin typeface="Cambria Math" charset="0"/>
                             </a:rPr>
                           </m:ctrlPr>
                         </m:sSubPr>
@@ -3244,7 +3249,7 @@
             </p:txBody>
           </p:sp>
         </mc:Choice>
-        <mc:Fallback>
+        <mc:Fallback xmlns="">
           <p:sp>
             <p:nvSpPr>
               <p:cNvPr id="194" name="Pentagon 193"/>
@@ -3291,8 +3296,8 @@
           </p:sp>
         </mc:Fallback>
       </mc:AlternateContent>
-      <mc:AlternateContent xmlns:mc="http://schemas.openxmlformats.org/markup-compatibility/2006">
-        <mc:Choice xmlns:a14="http://schemas.microsoft.com/office/drawing/2010/main" Requires="a14">
+      <mc:AlternateContent xmlns:mc="http://schemas.openxmlformats.org/markup-compatibility/2006" xmlns:a14="http://schemas.microsoft.com/office/drawing/2010/main">
+        <mc:Choice Requires="a14">
           <p:sp>
             <p:nvSpPr>
               <p:cNvPr id="195" name="Pentagon 194"/>
@@ -3353,7 +3358,7 @@
                         <m:sSubPr>
                           <m:ctrlPr>
                             <a:rPr lang="en-US" sz="3600" b="0" i="1" smtClean="0">
-                              <a:latin typeface="Cambria Math" panose="02040503050406030204" pitchFamily="18" charset="0"/>
+                              <a:latin typeface="Cambria Math" charset="0"/>
                             </a:rPr>
                           </m:ctrlPr>
                         </m:sSubPr>
@@ -3382,7 +3387,7 @@
             </p:txBody>
           </p:sp>
         </mc:Choice>
-        <mc:Fallback>
+        <mc:Fallback xmlns="">
           <p:sp>
             <p:nvSpPr>
               <p:cNvPr id="195" name="Pentagon 194"/>
@@ -3483,8 +3488,8 @@
             </a:p>
           </p:txBody>
         </p:sp>
-        <mc:AlternateContent xmlns:mc="http://schemas.openxmlformats.org/markup-compatibility/2006">
-          <mc:Choice xmlns:a14="http://schemas.microsoft.com/office/drawing/2010/main" Requires="a14">
+        <mc:AlternateContent xmlns:mc="http://schemas.openxmlformats.org/markup-compatibility/2006" xmlns:a14="http://schemas.microsoft.com/office/drawing/2010/main">
+          <mc:Choice Requires="a14">
             <p:sp>
               <p:nvSpPr>
                 <p:cNvPr id="198" name="Pentagon 197"/>
@@ -3531,7 +3536,7 @@
                           <m:sSubPr>
                             <m:ctrlPr>
                               <a:rPr lang="en-US" sz="3600" i="1" smtClean="0">
-                                <a:latin typeface="Cambria Math" panose="02040503050406030204" pitchFamily="18" charset="0"/>
+                                <a:latin typeface="Cambria Math" charset="0"/>
                               </a:rPr>
                             </m:ctrlPr>
                           </m:sSubPr>
@@ -3560,7 +3565,7 @@
               </p:txBody>
             </p:sp>
           </mc:Choice>
-          <mc:Fallback>
+          <mc:Fallback xmlns="">
             <p:sp>
               <p:nvSpPr>
                 <p:cNvPr id="198" name="Pentagon 197"/>
@@ -3599,8 +3604,8 @@
             </p:sp>
           </mc:Fallback>
         </mc:AlternateContent>
-        <mc:AlternateContent xmlns:mc="http://schemas.openxmlformats.org/markup-compatibility/2006">
-          <mc:Choice xmlns:a14="http://schemas.microsoft.com/office/drawing/2010/main" Requires="a14">
+        <mc:AlternateContent xmlns:mc="http://schemas.openxmlformats.org/markup-compatibility/2006" xmlns:a14="http://schemas.microsoft.com/office/drawing/2010/main">
+          <mc:Choice Requires="a14">
             <p:sp>
               <p:nvSpPr>
                 <p:cNvPr id="199" name="Pentagon 198"/>
@@ -3647,7 +3652,7 @@
                           <m:sSubPr>
                             <m:ctrlPr>
                               <a:rPr lang="en-US" sz="3600" i="1" smtClean="0">
-                                <a:latin typeface="Cambria Math" panose="02040503050406030204" pitchFamily="18" charset="0"/>
+                                <a:latin typeface="Cambria Math" charset="0"/>
                               </a:rPr>
                             </m:ctrlPr>
                           </m:sSubPr>
@@ -3676,7 +3681,7 @@
               </p:txBody>
             </p:sp>
           </mc:Choice>
-          <mc:Fallback>
+          <mc:Fallback xmlns="">
             <p:sp>
               <p:nvSpPr>
                 <p:cNvPr id="199" name="Pentagon 198"/>
@@ -3715,8 +3720,8 @@
             </p:sp>
           </mc:Fallback>
         </mc:AlternateContent>
-        <mc:AlternateContent xmlns:mc="http://schemas.openxmlformats.org/markup-compatibility/2006">
-          <mc:Choice xmlns:a14="http://schemas.microsoft.com/office/drawing/2010/main" Requires="a14">
+        <mc:AlternateContent xmlns:mc="http://schemas.openxmlformats.org/markup-compatibility/2006" xmlns:a14="http://schemas.microsoft.com/office/drawing/2010/main">
+          <mc:Choice Requires="a14">
             <p:sp>
               <p:nvSpPr>
                 <p:cNvPr id="200" name="Pentagon 199"/>
@@ -3763,7 +3768,7 @@
                           <m:sSubPr>
                             <m:ctrlPr>
                               <a:rPr lang="en-US" sz="3600" i="1" smtClean="0">
-                                <a:latin typeface="Cambria Math" panose="02040503050406030204" pitchFamily="18" charset="0"/>
+                                <a:latin typeface="Cambria Math" charset="0"/>
                               </a:rPr>
                             </m:ctrlPr>
                           </m:sSubPr>
@@ -3792,7 +3797,7 @@
               </p:txBody>
             </p:sp>
           </mc:Choice>
-          <mc:Fallback>
+          <mc:Fallback xmlns="">
             <p:sp>
               <p:nvSpPr>
                 <p:cNvPr id="200" name="Pentagon 199"/>
@@ -3831,8 +3836,8 @@
             </p:sp>
           </mc:Fallback>
         </mc:AlternateContent>
-        <mc:AlternateContent xmlns:mc="http://schemas.openxmlformats.org/markup-compatibility/2006">
-          <mc:Choice xmlns:a14="http://schemas.microsoft.com/office/drawing/2010/main" Requires="a14">
+        <mc:AlternateContent xmlns:mc="http://schemas.openxmlformats.org/markup-compatibility/2006" xmlns:a14="http://schemas.microsoft.com/office/drawing/2010/main">
+          <mc:Choice Requires="a14">
             <p:sp>
               <p:nvSpPr>
                 <p:cNvPr id="201" name="Pentagon 200"/>
@@ -3879,7 +3884,7 @@
                           <m:sSubPr>
                             <m:ctrlPr>
                               <a:rPr lang="en-US" sz="3600" i="1" smtClean="0">
-                                <a:latin typeface="Cambria Math" panose="02040503050406030204" pitchFamily="18" charset="0"/>
+                                <a:latin typeface="Cambria Math" charset="0"/>
                               </a:rPr>
                             </m:ctrlPr>
                           </m:sSubPr>
@@ -3908,7 +3913,7 @@
               </p:txBody>
             </p:sp>
           </mc:Choice>
-          <mc:Fallback>
+          <mc:Fallback xmlns="">
             <p:sp>
               <p:nvSpPr>
                 <p:cNvPr id="201" name="Pentagon 200"/>
@@ -3986,8 +3991,8 @@
           </p:txBody>
         </p:sp>
       </p:grpSp>
-      <mc:AlternateContent xmlns:mc="http://schemas.openxmlformats.org/markup-compatibility/2006">
-        <mc:Choice xmlns:a14="http://schemas.microsoft.com/office/drawing/2010/main" Requires="a14">
+      <mc:AlternateContent xmlns:mc="http://schemas.openxmlformats.org/markup-compatibility/2006" xmlns:a14="http://schemas.microsoft.com/office/drawing/2010/main">
+        <mc:Choice Requires="a14">
           <p:sp>
             <p:nvSpPr>
               <p:cNvPr id="203" name="Pentagon 202"/>
@@ -4048,7 +4053,7 @@
                         <m:sSubPr>
                           <m:ctrlPr>
                             <a:rPr lang="en-US" sz="3600" i="1" smtClean="0">
-                              <a:latin typeface="Cambria Math" panose="02040503050406030204" pitchFamily="18" charset="0"/>
+                              <a:latin typeface="Cambria Math" charset="0"/>
                             </a:rPr>
                           </m:ctrlPr>
                         </m:sSubPr>
@@ -4077,7 +4082,7 @@
             </p:txBody>
           </p:sp>
         </mc:Choice>
-        <mc:Fallback>
+        <mc:Fallback xmlns="">
           <p:sp>
             <p:nvSpPr>
               <p:cNvPr id="203" name="Pentagon 202"/>
@@ -4178,8 +4183,8 @@
             </a:p>
           </p:txBody>
         </p:sp>
-        <mc:AlternateContent xmlns:mc="http://schemas.openxmlformats.org/markup-compatibility/2006">
-          <mc:Choice xmlns:a14="http://schemas.microsoft.com/office/drawing/2010/main" Requires="a14">
+        <mc:AlternateContent xmlns:mc="http://schemas.openxmlformats.org/markup-compatibility/2006" xmlns:a14="http://schemas.microsoft.com/office/drawing/2010/main">
+          <mc:Choice Requires="a14">
             <p:sp>
               <p:nvSpPr>
                 <p:cNvPr id="206" name="Pentagon 205"/>
@@ -4226,7 +4231,7 @@
                           <m:sSubPr>
                             <m:ctrlPr>
                               <a:rPr lang="en-US" sz="3600" i="1" smtClean="0">
-                                <a:latin typeface="Cambria Math" panose="02040503050406030204" pitchFamily="18" charset="0"/>
+                                <a:latin typeface="Cambria Math" charset="0"/>
                               </a:rPr>
                             </m:ctrlPr>
                           </m:sSubPr>
@@ -4255,7 +4260,7 @@
               </p:txBody>
             </p:sp>
           </mc:Choice>
-          <mc:Fallback>
+          <mc:Fallback xmlns="">
             <p:sp>
               <p:nvSpPr>
                 <p:cNvPr id="206" name="Pentagon 205"/>
@@ -4294,8 +4299,8 @@
             </p:sp>
           </mc:Fallback>
         </mc:AlternateContent>
-        <mc:AlternateContent xmlns:mc="http://schemas.openxmlformats.org/markup-compatibility/2006">
-          <mc:Choice xmlns:a14="http://schemas.microsoft.com/office/drawing/2010/main" Requires="a14">
+        <mc:AlternateContent xmlns:mc="http://schemas.openxmlformats.org/markup-compatibility/2006" xmlns:a14="http://schemas.microsoft.com/office/drawing/2010/main">
+          <mc:Choice Requires="a14">
             <p:sp>
               <p:nvSpPr>
                 <p:cNvPr id="207" name="Pentagon 206"/>
@@ -4342,7 +4347,7 @@
                           <m:sSubPr>
                             <m:ctrlPr>
                               <a:rPr lang="en-US" sz="3600" i="1" smtClean="0">
-                                <a:latin typeface="Cambria Math" panose="02040503050406030204" pitchFamily="18" charset="0"/>
+                                <a:latin typeface="Cambria Math" charset="0"/>
                               </a:rPr>
                             </m:ctrlPr>
                           </m:sSubPr>
@@ -4371,7 +4376,7 @@
               </p:txBody>
             </p:sp>
           </mc:Choice>
-          <mc:Fallback>
+          <mc:Fallback xmlns="">
             <p:sp>
               <p:nvSpPr>
                 <p:cNvPr id="207" name="Pentagon 206"/>
@@ -4410,8 +4415,8 @@
             </p:sp>
           </mc:Fallback>
         </mc:AlternateContent>
-        <mc:AlternateContent xmlns:mc="http://schemas.openxmlformats.org/markup-compatibility/2006">
-          <mc:Choice xmlns:a14="http://schemas.microsoft.com/office/drawing/2010/main" Requires="a14">
+        <mc:AlternateContent xmlns:mc="http://schemas.openxmlformats.org/markup-compatibility/2006" xmlns:a14="http://schemas.microsoft.com/office/drawing/2010/main">
+          <mc:Choice Requires="a14">
             <p:sp>
               <p:nvSpPr>
                 <p:cNvPr id="208" name="Pentagon 207"/>
@@ -4458,7 +4463,7 @@
                           <m:sSubPr>
                             <m:ctrlPr>
                               <a:rPr lang="en-US" sz="3600" i="1" smtClean="0">
-                                <a:latin typeface="Cambria Math" panose="02040503050406030204" pitchFamily="18" charset="0"/>
+                                <a:latin typeface="Cambria Math" charset="0"/>
                               </a:rPr>
                             </m:ctrlPr>
                           </m:sSubPr>
@@ -4487,7 +4492,7 @@
               </p:txBody>
             </p:sp>
           </mc:Choice>
-          <mc:Fallback>
+          <mc:Fallback xmlns="">
             <p:sp>
               <p:nvSpPr>
                 <p:cNvPr id="208" name="Pentagon 207"/>
@@ -4540,6 +4545,9 @@
             <a:prstGeom prst="rect">
               <a:avLst/>
             </a:prstGeom>
+            <a:ln>
+              <a:noFill/>
+            </a:ln>
           </p:spPr>
           <p:style>
             <a:lnRef idx="2">
@@ -4580,8 +4588,8 @@
           </p:txBody>
         </p:sp>
       </p:grpSp>
-      <mc:AlternateContent xmlns:mc="http://schemas.openxmlformats.org/markup-compatibility/2006">
-        <mc:Choice xmlns:a14="http://schemas.microsoft.com/office/drawing/2010/main" Requires="a14">
+      <mc:AlternateContent xmlns:mc="http://schemas.openxmlformats.org/markup-compatibility/2006" xmlns:a14="http://schemas.microsoft.com/office/drawing/2010/main">
+        <mc:Choice Requires="a14">
           <p:sp>
             <p:nvSpPr>
               <p:cNvPr id="210" name="Pentagon 209"/>
@@ -4642,7 +4650,7 @@
                         <m:sSubPr>
                           <m:ctrlPr>
                             <a:rPr lang="en-US" sz="3600" b="0" i="1" smtClean="0">
-                              <a:latin typeface="Cambria Math" panose="02040503050406030204" pitchFamily="18" charset="0"/>
+                              <a:latin typeface="Cambria Math" charset="0"/>
                             </a:rPr>
                           </m:ctrlPr>
                         </m:sSubPr>
@@ -4671,7 +4679,7 @@
             </p:txBody>
           </p:sp>
         </mc:Choice>
-        <mc:Fallback>
+        <mc:Fallback xmlns="">
           <p:sp>
             <p:nvSpPr>
               <p:cNvPr id="210" name="Pentagon 209"/>
@@ -4718,8 +4726,8 @@
           </p:sp>
         </mc:Fallback>
       </mc:AlternateContent>
-      <mc:AlternateContent xmlns:mc="http://schemas.openxmlformats.org/markup-compatibility/2006">
-        <mc:Choice xmlns:a14="http://schemas.microsoft.com/office/drawing/2010/main" Requires="a14">
+      <mc:AlternateContent xmlns:mc="http://schemas.openxmlformats.org/markup-compatibility/2006" xmlns:a14="http://schemas.microsoft.com/office/drawing/2010/main">
+        <mc:Choice Requires="a14">
           <p:sp>
             <p:nvSpPr>
               <p:cNvPr id="211" name="TextBox 210"/>
@@ -4755,6 +4763,7 @@
               </a:bodyPr>
               <a:lstStyle/>
               <a:p>
+                <a:pPr/>
                 <a14:m>
                   <m:oMathPara xmlns:m="http://schemas.openxmlformats.org/officeDocument/2006/math">
                     <m:oMathParaPr>
@@ -4765,7 +4774,7 @@
                         <m:sSubSupPr>
                           <m:ctrlPr>
                             <a:rPr lang="en-US" sz="3200" b="0" i="1" smtClean="0">
-                              <a:latin typeface="Cambria Math" panose="02040503050406030204" pitchFamily="18" charset="0"/>
+                              <a:latin typeface="Cambria Math" charset="0"/>
                             </a:rPr>
                           </m:ctrlPr>
                         </m:sSubSupPr>
@@ -4806,6 +4815,7 @@
                 <a:endParaRPr lang="en-US" sz="3200" b="0" dirty="0" smtClean="0"/>
               </a:p>
               <a:p>
+                <a:pPr/>
                 <a14:m>
                   <m:oMathPara xmlns:m="http://schemas.openxmlformats.org/officeDocument/2006/math">
                     <m:oMathParaPr>
@@ -4816,7 +4826,7 @@
                         <m:sSubSupPr>
                           <m:ctrlPr>
                             <a:rPr lang="en-US" sz="3200" b="0" i="1" smtClean="0">
-                              <a:latin typeface="Cambria Math" panose="02040503050406030204" pitchFamily="18" charset="0"/>
+                              <a:latin typeface="Cambria Math" charset="0"/>
                             </a:rPr>
                           </m:ctrlPr>
                         </m:sSubSupPr>
@@ -4857,6 +4867,7 @@
                 <a:endParaRPr lang="en-US" sz="3200" b="0" dirty="0" smtClean="0"/>
               </a:p>
               <a:p>
+                <a:pPr/>
                 <a14:m>
                   <m:oMathPara xmlns:m="http://schemas.openxmlformats.org/officeDocument/2006/math">
                     <m:oMathParaPr>
@@ -4867,7 +4878,7 @@
                         <m:sSubSupPr>
                           <m:ctrlPr>
                             <a:rPr lang="en-US" sz="3200" b="0" i="1" smtClean="0">
-                              <a:latin typeface="Cambria Math" panose="02040503050406030204" pitchFamily="18" charset="0"/>
+                              <a:latin typeface="Cambria Math" charset="0"/>
                             </a:rPr>
                           </m:ctrlPr>
                         </m:sSubSupPr>
@@ -4908,6 +4919,7 @@
                 <a:endParaRPr lang="en-US" sz="3200" b="0" dirty="0" smtClean="0"/>
               </a:p>
               <a:p>
+                <a:pPr/>
                 <a14:m>
                   <m:oMathPara xmlns:m="http://schemas.openxmlformats.org/officeDocument/2006/math">
                     <m:oMathParaPr>
@@ -4918,7 +4930,7 @@
                         <m:sSubSupPr>
                           <m:ctrlPr>
                             <a:rPr lang="en-US" sz="3200" b="0" i="1" smtClean="0">
-                              <a:latin typeface="Cambria Math" panose="02040503050406030204" pitchFamily="18" charset="0"/>
+                              <a:latin typeface="Cambria Math" charset="0"/>
                             </a:rPr>
                           </m:ctrlPr>
                         </m:sSubSupPr>
@@ -4961,7 +4973,7 @@
             </p:txBody>
           </p:sp>
         </mc:Choice>
-        <mc:Fallback>
+        <mc:Fallback xmlns="">
           <p:sp>
             <p:nvSpPr>
               <p:cNvPr id="211" name="TextBox 210"/>
@@ -5000,8 +5012,8 @@
           </p:sp>
         </mc:Fallback>
       </mc:AlternateContent>
-      <mc:AlternateContent xmlns:mc="http://schemas.openxmlformats.org/markup-compatibility/2006">
-        <mc:Choice xmlns:a14="http://schemas.microsoft.com/office/drawing/2010/main" Requires="a14">
+      <mc:AlternateContent xmlns:mc="http://schemas.openxmlformats.org/markup-compatibility/2006" xmlns:a14="http://schemas.microsoft.com/office/drawing/2010/main">
+        <mc:Choice Requires="a14">
           <p:sp>
             <p:nvSpPr>
               <p:cNvPr id="212" name="TextBox 211"/>
@@ -5037,6 +5049,7 @@
               </a:bodyPr>
               <a:lstStyle/>
               <a:p>
+                <a:pPr/>
                 <a14:m>
                   <m:oMathPara xmlns:m="http://schemas.openxmlformats.org/officeDocument/2006/math">
                     <m:oMathParaPr>
@@ -5047,7 +5060,7 @@
                         <m:sSubSupPr>
                           <m:ctrlPr>
                             <a:rPr lang="en-US" sz="3200" b="0" i="1" smtClean="0">
-                              <a:latin typeface="Cambria Math" panose="02040503050406030204" pitchFamily="18" charset="0"/>
+                              <a:latin typeface="Cambria Math" charset="0"/>
                             </a:rPr>
                           </m:ctrlPr>
                         </m:sSubSupPr>
@@ -5088,6 +5101,7 @@
                 <a:endParaRPr lang="en-US" sz="3200" b="0" dirty="0" smtClean="0"/>
               </a:p>
               <a:p>
+                <a:pPr/>
                 <a14:m>
                   <m:oMathPara xmlns:m="http://schemas.openxmlformats.org/officeDocument/2006/math">
                     <m:oMathParaPr>
@@ -5098,7 +5112,7 @@
                         <m:sSubSupPr>
                           <m:ctrlPr>
                             <a:rPr lang="en-US" sz="3200" b="0" i="1" smtClean="0">
-                              <a:latin typeface="Cambria Math" panose="02040503050406030204" pitchFamily="18" charset="0"/>
+                              <a:latin typeface="Cambria Math" charset="0"/>
                             </a:rPr>
                           </m:ctrlPr>
                         </m:sSubSupPr>
@@ -5139,6 +5153,7 @@
                 <a:endParaRPr lang="en-US" sz="3200" b="0" dirty="0" smtClean="0"/>
               </a:p>
               <a:p>
+                <a:pPr/>
                 <a14:m>
                   <m:oMathPara xmlns:m="http://schemas.openxmlformats.org/officeDocument/2006/math">
                     <m:oMathParaPr>
@@ -5149,7 +5164,7 @@
                         <m:sSubSupPr>
                           <m:ctrlPr>
                             <a:rPr lang="en-US" sz="3200" b="0" i="1" smtClean="0">
-                              <a:latin typeface="Cambria Math" panose="02040503050406030204" pitchFamily="18" charset="0"/>
+                              <a:latin typeface="Cambria Math" charset="0"/>
                             </a:rPr>
                           </m:ctrlPr>
                         </m:sSubSupPr>
@@ -5192,7 +5207,7 @@
             </p:txBody>
           </p:sp>
         </mc:Choice>
-        <mc:Fallback>
+        <mc:Fallback xmlns="">
           <p:sp>
             <p:nvSpPr>
               <p:cNvPr id="212" name="TextBox 211"/>
@@ -5231,8 +5246,8 @@
           </p:sp>
         </mc:Fallback>
       </mc:AlternateContent>
-      <mc:AlternateContent xmlns:mc="http://schemas.openxmlformats.org/markup-compatibility/2006">
-        <mc:Choice xmlns:a14="http://schemas.microsoft.com/office/drawing/2010/main" Requires="a14">
+      <mc:AlternateContent xmlns:mc="http://schemas.openxmlformats.org/markup-compatibility/2006" xmlns:a14="http://schemas.microsoft.com/office/drawing/2010/main">
+        <mc:Choice Requires="a14">
           <p:sp>
             <p:nvSpPr>
               <p:cNvPr id="213" name="TextBox 212"/>
@@ -5255,6 +5270,7 @@
               </a:bodyPr>
               <a:lstStyle/>
               <a:p>
+                <a:pPr/>
                 <a14:m>
                   <m:oMathPara xmlns:m="http://schemas.openxmlformats.org/officeDocument/2006/math">
                     <m:oMathParaPr>
@@ -5265,7 +5281,7 @@
                         <m:sSubPr>
                           <m:ctrlPr>
                             <a:rPr lang="en-US" sz="3200" b="0" i="1" smtClean="0">
-                              <a:latin typeface="Cambria Math" panose="02040503050406030204" pitchFamily="18" charset="0"/>
+                              <a:latin typeface="Cambria Math" charset="0"/>
                             </a:rPr>
                           </m:ctrlPr>
                         </m:sSubPr>
@@ -5298,7 +5314,7 @@
                           <m:endChr m:val="}"/>
                           <m:ctrlPr>
                             <a:rPr lang="en-US" sz="3200" b="0" i="1" smtClean="0">
-                              <a:latin typeface="Cambria Math" panose="02040503050406030204" pitchFamily="18" charset="0"/>
+                              <a:latin typeface="Cambria Math" charset="0"/>
                             </a:rPr>
                           </m:ctrlPr>
                         </m:dPr>
@@ -5319,7 +5335,7 @@
             </p:txBody>
           </p:sp>
         </mc:Choice>
-        <mc:Fallback>
+        <mc:Fallback xmlns="">
           <p:sp>
             <p:nvSpPr>
               <p:cNvPr id="213" name="TextBox 212"/>
@@ -5358,8 +5374,8 @@
           </p:sp>
         </mc:Fallback>
       </mc:AlternateContent>
-      <mc:AlternateContent xmlns:mc="http://schemas.openxmlformats.org/markup-compatibility/2006">
-        <mc:Choice xmlns:a14="http://schemas.microsoft.com/office/drawing/2010/main" Requires="a14">
+      <mc:AlternateContent xmlns:mc="http://schemas.openxmlformats.org/markup-compatibility/2006" xmlns:a14="http://schemas.microsoft.com/office/drawing/2010/main">
+        <mc:Choice Requires="a14">
           <p:sp>
             <p:nvSpPr>
               <p:cNvPr id="214" name="Rectangle 213"/>
@@ -5381,6 +5397,7 @@
               </a:bodyPr>
               <a:lstStyle/>
               <a:p>
+                <a:pPr/>
                 <a14:m>
                   <m:oMathPara xmlns:m="http://schemas.openxmlformats.org/officeDocument/2006/math">
                     <m:oMathParaPr>
@@ -5391,7 +5408,7 @@
                         <m:sSubPr>
                           <m:ctrlPr>
                             <a:rPr lang="en-US" sz="3200" i="1">
-                              <a:latin typeface="Cambria Math" panose="02040503050406030204" pitchFamily="18" charset="0"/>
+                              <a:latin typeface="Cambria Math" charset="0"/>
                             </a:rPr>
                           </m:ctrlPr>
                         </m:sSubPr>
@@ -5424,7 +5441,7 @@
                           <m:endChr m:val="}"/>
                           <m:ctrlPr>
                             <a:rPr lang="en-US" sz="3200" i="1">
-                              <a:latin typeface="Cambria Math" panose="02040503050406030204" pitchFamily="18" charset="0"/>
+                              <a:latin typeface="Cambria Math" charset="0"/>
                             </a:rPr>
                           </m:ctrlPr>
                         </m:dPr>
@@ -5445,7 +5462,7 @@
             </p:txBody>
           </p:sp>
         </mc:Choice>
-        <mc:Fallback>
+        <mc:Fallback xmlns="">
           <p:sp>
             <p:nvSpPr>
               <p:cNvPr id="214" name="Rectangle 213"/>
@@ -5484,8 +5501,8 @@
           </p:sp>
         </mc:Fallback>
       </mc:AlternateContent>
-      <mc:AlternateContent xmlns:mc="http://schemas.openxmlformats.org/markup-compatibility/2006">
-        <mc:Choice xmlns:a14="http://schemas.microsoft.com/office/drawing/2010/main" Requires="a14">
+      <mc:AlternateContent xmlns:mc="http://schemas.openxmlformats.org/markup-compatibility/2006" xmlns:a14="http://schemas.microsoft.com/office/drawing/2010/main">
+        <mc:Choice Requires="a14">
           <p:sp>
             <p:nvSpPr>
               <p:cNvPr id="215" name="Rectangle 214"/>
@@ -5507,6 +5524,7 @@
               </a:bodyPr>
               <a:lstStyle/>
               <a:p>
+                <a:pPr/>
                 <a14:m>
                   <m:oMathPara xmlns:m="http://schemas.openxmlformats.org/officeDocument/2006/math">
                     <m:oMathParaPr>
@@ -5517,7 +5535,7 @@
                         <m:sSubPr>
                           <m:ctrlPr>
                             <a:rPr lang="en-US" sz="3200" i="1">
-                              <a:latin typeface="Cambria Math" panose="02040503050406030204" pitchFamily="18" charset="0"/>
+                              <a:latin typeface="Cambria Math" charset="0"/>
                             </a:rPr>
                           </m:ctrlPr>
                         </m:sSubPr>
@@ -5550,7 +5568,7 @@
                           <m:endChr m:val="}"/>
                           <m:ctrlPr>
                             <a:rPr lang="en-US" sz="3200" i="1">
-                              <a:latin typeface="Cambria Math" panose="02040503050406030204" pitchFamily="18" charset="0"/>
+                              <a:latin typeface="Cambria Math" charset="0"/>
                             </a:rPr>
                           </m:ctrlPr>
                         </m:dPr>
@@ -5571,7 +5589,7 @@
             </p:txBody>
           </p:sp>
         </mc:Choice>
-        <mc:Fallback>
+        <mc:Fallback xmlns="">
           <p:sp>
             <p:nvSpPr>
               <p:cNvPr id="215" name="Rectangle 214"/>
@@ -5610,8 +5628,8 @@
           </p:sp>
         </mc:Fallback>
       </mc:AlternateContent>
-      <mc:AlternateContent xmlns:mc="http://schemas.openxmlformats.org/markup-compatibility/2006">
-        <mc:Choice xmlns:a14="http://schemas.microsoft.com/office/drawing/2010/main" Requires="a14">
+      <mc:AlternateContent xmlns:mc="http://schemas.openxmlformats.org/markup-compatibility/2006" xmlns:a14="http://schemas.microsoft.com/office/drawing/2010/main">
+        <mc:Choice Requires="a14">
           <p:sp>
             <p:nvSpPr>
               <p:cNvPr id="216" name="Rectangle 215"/>
@@ -5633,6 +5651,7 @@
               </a:bodyPr>
               <a:lstStyle/>
               <a:p>
+                <a:pPr/>
                 <a14:m>
                   <m:oMathPara xmlns:m="http://schemas.openxmlformats.org/officeDocument/2006/math">
                     <m:oMathParaPr>
@@ -5643,7 +5662,7 @@
                         <m:sSubPr>
                           <m:ctrlPr>
                             <a:rPr lang="en-US" sz="3200" i="1">
-                              <a:latin typeface="Cambria Math" panose="02040503050406030204" pitchFamily="18" charset="0"/>
+                              <a:latin typeface="Cambria Math" charset="0"/>
                             </a:rPr>
                           </m:ctrlPr>
                         </m:sSubPr>
@@ -5676,7 +5695,7 @@
                           <m:endChr m:val="}"/>
                           <m:ctrlPr>
                             <a:rPr lang="en-US" sz="3200" i="1">
-                              <a:latin typeface="Cambria Math" panose="02040503050406030204" pitchFamily="18" charset="0"/>
+                              <a:latin typeface="Cambria Math" charset="0"/>
                             </a:rPr>
                           </m:ctrlPr>
                         </m:dPr>
@@ -5697,7 +5716,7 @@
             </p:txBody>
           </p:sp>
         </mc:Choice>
-        <mc:Fallback>
+        <mc:Fallback xmlns="">
           <p:sp>
             <p:nvSpPr>
               <p:cNvPr id="216" name="Rectangle 215"/>

</xml_diff>